<commit_message>
added Learning Objectives to L3.1, next steps to L3.1 and 3.2
</commit_message>
<xml_diff>
--- a/Slides/Lesson 3.2 HTTP Basics.pptx
+++ b/Slides/Lesson 3.2 HTTP Basics.pptx
@@ -239,7 +239,7 @@
           <a:p>
             <a:fld id="{7C7E5181-6CF5-45F7-A87A-E0E0B1FD7549}" type="datetimeFigureOut">
               <a:rPr lang="en-US" smtClean="0"/>
-              <a:t>1/28/2021</a:t>
+              <a:t>1/30/2021</a:t>
             </a:fld>
             <a:endParaRPr lang="en-US"/>
           </a:p>
@@ -660,7 +660,7 @@
           <a:p>
             <a:fld id="{5D2A64DE-480B-420F-9649-4F8E696E08E0}" type="datetime1">
               <a:rPr lang="en-US" smtClean="0"/>
-              <a:t>1/28/2021</a:t>
+              <a:t>1/30/2021</a:t>
             </a:fld>
             <a:endParaRPr lang="en-US"/>
           </a:p>
@@ -894,7 +894,7 @@
           <a:p>
             <a:fld id="{0D3616D0-8311-4107-9726-6B805E7D05BA}" type="datetime1">
               <a:rPr lang="en-US" smtClean="0"/>
-              <a:t>1/28/2021</a:t>
+              <a:t>1/30/2021</a:t>
             </a:fld>
             <a:endParaRPr lang="en-US"/>
           </a:p>
@@ -1102,7 +1102,7 @@
           <a:p>
             <a:fld id="{3BC2557A-5C88-417A-A763-5AC779462A5F}" type="datetime1">
               <a:rPr lang="en-US" smtClean="0"/>
-              <a:t>1/28/2021</a:t>
+              <a:t>1/30/2021</a:t>
             </a:fld>
             <a:endParaRPr lang="en-US"/>
           </a:p>
@@ -1626,7 +1626,7 @@
           <a:p>
             <a:fld id="{07C7BFD4-467E-4EDE-93EA-052F5B39A4E5}" type="datetime1">
               <a:rPr lang="en-US" smtClean="0"/>
-              <a:t>1/28/2021</a:t>
+              <a:t>1/30/2021</a:t>
             </a:fld>
             <a:endParaRPr lang="en-US"/>
           </a:p>
@@ -1939,7 +1939,7 @@
           <a:p>
             <a:fld id="{A533CBE2-D5BE-47AC-ADC2-9CDFC1D0CF90}" type="datetime1">
               <a:rPr lang="en-US" smtClean="0"/>
-              <a:t>1/28/2021</a:t>
+              <a:t>1/30/2021</a:t>
             </a:fld>
             <a:endParaRPr lang="en-US"/>
           </a:p>
@@ -2240,7 +2240,7 @@
           <a:p>
             <a:fld id="{39B7EDB1-CE74-4951-85A2-0B01C2128E28}" type="datetime1">
               <a:rPr lang="en-US" smtClean="0"/>
-              <a:t>1/28/2021</a:t>
+              <a:t>1/30/2021</a:t>
             </a:fld>
             <a:endParaRPr lang="en-US"/>
           </a:p>
@@ -2688,7 +2688,7 @@
           <a:p>
             <a:fld id="{2BC7EB92-A5C2-4807-A9DC-9EDE6CBFB241}" type="datetime1">
               <a:rPr lang="en-US" smtClean="0"/>
-              <a:t>1/28/2021</a:t>
+              <a:t>1/30/2021</a:t>
             </a:fld>
             <a:endParaRPr lang="en-US"/>
           </a:p>
@@ -2834,7 +2834,7 @@
           <a:p>
             <a:fld id="{109E55A0-C911-4F03-82FC-7E5926047D46}" type="datetime1">
               <a:rPr lang="en-US" smtClean="0"/>
-              <a:t>1/28/2021</a:t>
+              <a:t>1/30/2021</a:t>
             </a:fld>
             <a:endParaRPr lang="en-US"/>
           </a:p>
@@ -2983,7 +2983,7 @@
           <a:p>
             <a:fld id="{2B7B7EE0-7771-4CD5-9B2B-3550753A54A1}" type="datetime1">
               <a:rPr lang="en-US" smtClean="0"/>
-              <a:t>1/28/2021</a:t>
+              <a:t>1/30/2021</a:t>
             </a:fld>
             <a:endParaRPr lang="en-US"/>
           </a:p>
@@ -3294,7 +3294,7 @@
           <a:p>
             <a:fld id="{F8B318B3-0E87-4416-A9B8-D891968C2727}" type="datetime1">
               <a:rPr lang="en-US" smtClean="0"/>
-              <a:t>1/28/2021</a:t>
+              <a:t>1/30/2021</a:t>
             </a:fld>
             <a:endParaRPr lang="en-US"/>
           </a:p>
@@ -3582,7 +3582,7 @@
           <a:p>
             <a:fld id="{EA476A42-A091-4468-A075-64A31BE59948}" type="datetime1">
               <a:rPr lang="en-US" smtClean="0"/>
-              <a:t>1/28/2021</a:t>
+              <a:t>1/30/2021</a:t>
             </a:fld>
             <a:endParaRPr lang="en-US"/>
           </a:p>
@@ -3823,7 +3823,7 @@
           <a:p>
             <a:fld id="{54D997E8-DDEE-43F1-8D9B-F8A1E11DE488}" type="datetime1">
               <a:rPr lang="en-US" smtClean="0"/>
-              <a:t>1/28/2021</a:t>
+              <a:t>1/30/2021</a:t>
             </a:fld>
             <a:endParaRPr lang="en-US"/>
           </a:p>
@@ -6966,6 +6966,225 @@
               <a:t>16</a:t>
             </a:fld>
             <a:endParaRPr lang="en-US"/>
+          </a:p>
+        </p:txBody>
+      </p:sp>
+      <p:sp>
+        <p:nvSpPr>
+          <p:cNvPr id="5" name="Text Placeholder 2">
+            <a:extLst>
+              <a:ext uri="{FF2B5EF4-FFF2-40B4-BE49-F238E27FC236}">
+                <a16:creationId xmlns:a16="http://schemas.microsoft.com/office/drawing/2014/main" id="{4FB3D6D2-D150-43A6-BD19-D484F0270E9B}"/>
+              </a:ext>
+            </a:extLst>
+          </p:cNvPr>
+          <p:cNvSpPr txBox="1">
+            <a:spLocks/>
+          </p:cNvSpPr>
+          <p:nvPr/>
+        </p:nvSpPr>
+        <p:spPr>
+          <a:xfrm>
+            <a:off x="990600" y="1652560"/>
+            <a:ext cx="7887346" cy="4351338"/>
+          </a:xfrm>
+          <a:prstGeom prst="rect">
+            <a:avLst/>
+          </a:prstGeom>
+        </p:spPr>
+        <p:txBody>
+          <a:bodyPr vert="horz" lIns="91440" tIns="45720" rIns="91440" bIns="45720" rtlCol="0">
+            <a:normAutofit/>
+          </a:bodyPr>
+          <a:lstStyle>
+            <a:lvl1pPr marL="228600" indent="-228600" algn="l" defTabSz="914400" rtl="0" eaLnBrk="1" latinLnBrk="0" hangingPunct="1">
+              <a:lnSpc>
+                <a:spcPct val="90000"/>
+              </a:lnSpc>
+              <a:spcBef>
+                <a:spcPts val="1000"/>
+              </a:spcBef>
+              <a:buFont typeface="Arial" panose="020B0604020202020204" pitchFamily="34" charset="0"/>
+              <a:buChar char="•"/>
+              <a:defRPr sz="2800" kern="1200">
+                <a:solidFill>
+                  <a:schemeClr val="tx1"/>
+                </a:solidFill>
+                <a:latin typeface="+mn-lt"/>
+                <a:ea typeface="+mn-ea"/>
+                <a:cs typeface="+mn-cs"/>
+              </a:defRPr>
+            </a:lvl1pPr>
+            <a:lvl2pPr marL="685800" indent="-228600" algn="l" defTabSz="914400" rtl="0" eaLnBrk="1" latinLnBrk="0" hangingPunct="1">
+              <a:lnSpc>
+                <a:spcPct val="90000"/>
+              </a:lnSpc>
+              <a:spcBef>
+                <a:spcPts val="500"/>
+              </a:spcBef>
+              <a:buFont typeface="Arial" panose="020B0604020202020204" pitchFamily="34" charset="0"/>
+              <a:buChar char="•"/>
+              <a:defRPr sz="2400" kern="1200">
+                <a:solidFill>
+                  <a:schemeClr val="tx1"/>
+                </a:solidFill>
+                <a:latin typeface="+mn-lt"/>
+                <a:ea typeface="+mn-ea"/>
+                <a:cs typeface="+mn-cs"/>
+              </a:defRPr>
+            </a:lvl2pPr>
+            <a:lvl3pPr marL="1143000" indent="-228600" algn="l" defTabSz="914400" rtl="0" eaLnBrk="1" latinLnBrk="0" hangingPunct="1">
+              <a:lnSpc>
+                <a:spcPct val="90000"/>
+              </a:lnSpc>
+              <a:spcBef>
+                <a:spcPts val="500"/>
+              </a:spcBef>
+              <a:buFont typeface="Arial" panose="020B0604020202020204" pitchFamily="34" charset="0"/>
+              <a:buChar char="•"/>
+              <a:defRPr sz="2000" kern="1200">
+                <a:solidFill>
+                  <a:schemeClr val="tx1"/>
+                </a:solidFill>
+                <a:latin typeface="+mn-lt"/>
+                <a:ea typeface="+mn-ea"/>
+                <a:cs typeface="+mn-cs"/>
+              </a:defRPr>
+            </a:lvl3pPr>
+            <a:lvl4pPr marL="1600200" indent="-228600" algn="l" defTabSz="914400" rtl="0" eaLnBrk="1" latinLnBrk="0" hangingPunct="1">
+              <a:lnSpc>
+                <a:spcPct val="90000"/>
+              </a:lnSpc>
+              <a:spcBef>
+                <a:spcPts val="500"/>
+              </a:spcBef>
+              <a:buFont typeface="Arial" panose="020B0604020202020204" pitchFamily="34" charset="0"/>
+              <a:buChar char="•"/>
+              <a:defRPr sz="1800" kern="1200">
+                <a:solidFill>
+                  <a:schemeClr val="tx1"/>
+                </a:solidFill>
+                <a:latin typeface="+mn-lt"/>
+                <a:ea typeface="+mn-ea"/>
+                <a:cs typeface="+mn-cs"/>
+              </a:defRPr>
+            </a:lvl4pPr>
+            <a:lvl5pPr marL="2057400" indent="-228600" algn="l" defTabSz="914400" rtl="0" eaLnBrk="1" latinLnBrk="0" hangingPunct="1">
+              <a:lnSpc>
+                <a:spcPct val="90000"/>
+              </a:lnSpc>
+              <a:spcBef>
+                <a:spcPts val="500"/>
+              </a:spcBef>
+              <a:buFont typeface="Arial" panose="020B0604020202020204" pitchFamily="34" charset="0"/>
+              <a:buChar char="•"/>
+              <a:defRPr sz="1800" kern="1200">
+                <a:solidFill>
+                  <a:schemeClr val="tx1"/>
+                </a:solidFill>
+                <a:latin typeface="+mn-lt"/>
+                <a:ea typeface="+mn-ea"/>
+                <a:cs typeface="+mn-cs"/>
+              </a:defRPr>
+            </a:lvl5pPr>
+            <a:lvl6pPr marL="2514600" indent="-228600" algn="l" defTabSz="914400" rtl="0" eaLnBrk="1" latinLnBrk="0" hangingPunct="1">
+              <a:lnSpc>
+                <a:spcPct val="90000"/>
+              </a:lnSpc>
+              <a:spcBef>
+                <a:spcPts val="500"/>
+              </a:spcBef>
+              <a:buFont typeface="Arial" panose="020B0604020202020204" pitchFamily="34" charset="0"/>
+              <a:buChar char="•"/>
+              <a:defRPr sz="1800" kern="1200">
+                <a:solidFill>
+                  <a:schemeClr val="tx1"/>
+                </a:solidFill>
+                <a:latin typeface="+mn-lt"/>
+                <a:ea typeface="+mn-ea"/>
+                <a:cs typeface="+mn-cs"/>
+              </a:defRPr>
+            </a:lvl6pPr>
+            <a:lvl7pPr marL="2971800" indent="-228600" algn="l" defTabSz="914400" rtl="0" eaLnBrk="1" latinLnBrk="0" hangingPunct="1">
+              <a:lnSpc>
+                <a:spcPct val="90000"/>
+              </a:lnSpc>
+              <a:spcBef>
+                <a:spcPts val="500"/>
+              </a:spcBef>
+              <a:buFont typeface="Arial" panose="020B0604020202020204" pitchFamily="34" charset="0"/>
+              <a:buChar char="•"/>
+              <a:defRPr sz="1800" kern="1200">
+                <a:solidFill>
+                  <a:schemeClr val="tx1"/>
+                </a:solidFill>
+                <a:latin typeface="+mn-lt"/>
+                <a:ea typeface="+mn-ea"/>
+                <a:cs typeface="+mn-cs"/>
+              </a:defRPr>
+            </a:lvl7pPr>
+            <a:lvl8pPr marL="3429000" indent="-228600" algn="l" defTabSz="914400" rtl="0" eaLnBrk="1" latinLnBrk="0" hangingPunct="1">
+              <a:lnSpc>
+                <a:spcPct val="90000"/>
+              </a:lnSpc>
+              <a:spcBef>
+                <a:spcPts val="500"/>
+              </a:spcBef>
+              <a:buFont typeface="Arial" panose="020B0604020202020204" pitchFamily="34" charset="0"/>
+              <a:buChar char="•"/>
+              <a:defRPr sz="1800" kern="1200">
+                <a:solidFill>
+                  <a:schemeClr val="tx1"/>
+                </a:solidFill>
+                <a:latin typeface="+mn-lt"/>
+                <a:ea typeface="+mn-ea"/>
+                <a:cs typeface="+mn-cs"/>
+              </a:defRPr>
+            </a:lvl8pPr>
+            <a:lvl9pPr marL="3886200" indent="-228600" algn="l" defTabSz="914400" rtl="0" eaLnBrk="1" latinLnBrk="0" hangingPunct="1">
+              <a:lnSpc>
+                <a:spcPct val="90000"/>
+              </a:lnSpc>
+              <a:spcBef>
+                <a:spcPts val="500"/>
+              </a:spcBef>
+              <a:buFont typeface="Arial" panose="020B0604020202020204" pitchFamily="34" charset="0"/>
+              <a:buChar char="•"/>
+              <a:defRPr sz="1800" kern="1200">
+                <a:solidFill>
+                  <a:schemeClr val="tx1"/>
+                </a:solidFill>
+                <a:latin typeface="+mn-lt"/>
+                <a:ea typeface="+mn-ea"/>
+                <a:cs typeface="+mn-cs"/>
+              </a:defRPr>
+            </a:lvl9pPr>
+          </a:lstStyle>
+          <a:p>
+            <a:r>
+              <a:rPr lang="en-US" dirty="0"/>
+              <a:t>In the next lesson, we will learn about REST, a philosophy for </a:t>
+            </a:r>
+            <a:r>
+              <a:rPr lang="en-US"/>
+              <a:t>designing application-level protocols </a:t>
+            </a:r>
+            <a:r>
+              <a:rPr lang="en-US" dirty="0"/>
+              <a:t>on top of http.</a:t>
+            </a:r>
+          </a:p>
+          <a:p>
+            <a:pPr lvl="1"/>
+            <a:endParaRPr lang="en-US" dirty="0"/>
+          </a:p>
+          <a:p>
+            <a:pPr lvl="2"/>
+            <a:endParaRPr lang="en-US" dirty="0"/>
+          </a:p>
+          <a:p>
+            <a:pPr lvl="1"/>
+            <a:endParaRPr lang="en-US" dirty="0"/>
           </a:p>
         </p:txBody>
       </p:sp>

</xml_diff>

<commit_message>
updated L3.1-3.3, added L3.4 in progress
</commit_message>
<xml_diff>
--- a/Slides/Lesson 3.2 HTTP Basics.pptx
+++ b/Slides/Lesson 3.2 HTTP Basics.pptx
@@ -239,7 +239,7 @@
           <a:p>
             <a:fld id="{7C7E5181-6CF5-45F7-A87A-E0E0B1FD7549}" type="datetimeFigureOut">
               <a:rPr lang="en-US" smtClean="0"/>
-              <a:t>1/30/2021</a:t>
+              <a:t>1/31/2021</a:t>
             </a:fld>
             <a:endParaRPr lang="en-US"/>
           </a:p>
@@ -660,7 +660,7 @@
           <a:p>
             <a:fld id="{5D2A64DE-480B-420F-9649-4F8E696E08E0}" type="datetime1">
               <a:rPr lang="en-US" smtClean="0"/>
-              <a:t>1/30/2021</a:t>
+              <a:t>1/31/2021</a:t>
             </a:fld>
             <a:endParaRPr lang="en-US"/>
           </a:p>
@@ -894,7 +894,7 @@
           <a:p>
             <a:fld id="{0D3616D0-8311-4107-9726-6B805E7D05BA}" type="datetime1">
               <a:rPr lang="en-US" smtClean="0"/>
-              <a:t>1/30/2021</a:t>
+              <a:t>1/31/2021</a:t>
             </a:fld>
             <a:endParaRPr lang="en-US"/>
           </a:p>
@@ -1102,7 +1102,7 @@
           <a:p>
             <a:fld id="{3BC2557A-5C88-417A-A763-5AC779462A5F}" type="datetime1">
               <a:rPr lang="en-US" smtClean="0"/>
-              <a:t>1/30/2021</a:t>
+              <a:t>1/31/2021</a:t>
             </a:fld>
             <a:endParaRPr lang="en-US"/>
           </a:p>
@@ -1626,7 +1626,7 @@
           <a:p>
             <a:fld id="{07C7BFD4-467E-4EDE-93EA-052F5B39A4E5}" type="datetime1">
               <a:rPr lang="en-US" smtClean="0"/>
-              <a:t>1/30/2021</a:t>
+              <a:t>1/31/2021</a:t>
             </a:fld>
             <a:endParaRPr lang="en-US"/>
           </a:p>
@@ -1939,7 +1939,7 @@
           <a:p>
             <a:fld id="{A533CBE2-D5BE-47AC-ADC2-9CDFC1D0CF90}" type="datetime1">
               <a:rPr lang="en-US" smtClean="0"/>
-              <a:t>1/30/2021</a:t>
+              <a:t>1/31/2021</a:t>
             </a:fld>
             <a:endParaRPr lang="en-US"/>
           </a:p>
@@ -2240,7 +2240,7 @@
           <a:p>
             <a:fld id="{39B7EDB1-CE74-4951-85A2-0B01C2128E28}" type="datetime1">
               <a:rPr lang="en-US" smtClean="0"/>
-              <a:t>1/30/2021</a:t>
+              <a:t>1/31/2021</a:t>
             </a:fld>
             <a:endParaRPr lang="en-US"/>
           </a:p>
@@ -2688,7 +2688,7 @@
           <a:p>
             <a:fld id="{2BC7EB92-A5C2-4807-A9DC-9EDE6CBFB241}" type="datetime1">
               <a:rPr lang="en-US" smtClean="0"/>
-              <a:t>1/30/2021</a:t>
+              <a:t>1/31/2021</a:t>
             </a:fld>
             <a:endParaRPr lang="en-US"/>
           </a:p>
@@ -2834,7 +2834,7 @@
           <a:p>
             <a:fld id="{109E55A0-C911-4F03-82FC-7E5926047D46}" type="datetime1">
               <a:rPr lang="en-US" smtClean="0"/>
-              <a:t>1/30/2021</a:t>
+              <a:t>1/31/2021</a:t>
             </a:fld>
             <a:endParaRPr lang="en-US"/>
           </a:p>
@@ -2983,7 +2983,7 @@
           <a:p>
             <a:fld id="{2B7B7EE0-7771-4CD5-9B2B-3550753A54A1}" type="datetime1">
               <a:rPr lang="en-US" smtClean="0"/>
-              <a:t>1/30/2021</a:t>
+              <a:t>1/31/2021</a:t>
             </a:fld>
             <a:endParaRPr lang="en-US"/>
           </a:p>
@@ -3294,7 +3294,7 @@
           <a:p>
             <a:fld id="{F8B318B3-0E87-4416-A9B8-D891968C2727}" type="datetime1">
               <a:rPr lang="en-US" smtClean="0"/>
-              <a:t>1/30/2021</a:t>
+              <a:t>1/31/2021</a:t>
             </a:fld>
             <a:endParaRPr lang="en-US"/>
           </a:p>
@@ -3582,7 +3582,7 @@
           <a:p>
             <a:fld id="{EA476A42-A091-4468-A075-64A31BE59948}" type="datetime1">
               <a:rPr lang="en-US" smtClean="0"/>
-              <a:t>1/30/2021</a:t>
+              <a:t>1/31/2021</a:t>
             </a:fld>
             <a:endParaRPr lang="en-US"/>
           </a:p>
@@ -3823,7 +3823,7 @@
           <a:p>
             <a:fld id="{54D997E8-DDEE-43F1-8D9B-F8A1E11DE488}" type="datetime1">
               <a:rPr lang="en-US" smtClean="0"/>
-              <a:t>1/30/2021</a:t>
+              <a:t>1/31/2021</a:t>
             </a:fld>
             <a:endParaRPr lang="en-US"/>
           </a:p>
@@ -4986,7 +4986,7 @@
         <p:spPr/>
         <p:txBody>
           <a:bodyPr>
-            <a:normAutofit lnSpcReduction="10000"/>
+            <a:normAutofit fontScale="92500" lnSpcReduction="20000"/>
           </a:bodyPr>
           <a:lstStyle/>
           <a:p>
@@ -5010,7 +5010,7 @@
           <a:p>
             <a:r>
               <a:rPr lang="en-US" dirty="0"/>
-              <a:t>There are just a few of these that you should know:</a:t>
+              <a:t>There are just a few of these.  Here are the ones that you should know:</a:t>
             </a:r>
           </a:p>
           <a:p>
@@ -5020,6 +5020,13 @@
             </a:r>
           </a:p>
           <a:p>
+            <a:pPr lvl="1"/>
+            <a:r>
+              <a:rPr lang="en-US" dirty="0"/>
+              <a:t>the path is the name of the resource</a:t>
+            </a:r>
+          </a:p>
+          <a:p>
             <a:r>
               <a:rPr lang="en-US" dirty="0"/>
               <a:t>POST: requests the server to create a resource</a:t>
@@ -5029,13 +5036,20 @@
             <a:pPr lvl="1"/>
             <a:r>
               <a:rPr lang="en-US" dirty="0"/>
-              <a:t>there are several ways in which the value of the resource can be transmitted (more later)</a:t>
-            </a:r>
-          </a:p>
-          <a:p>
-            <a:r>
-              <a:rPr lang="en-US" dirty="0"/>
-              <a:t>PUT: requests the server to change the value of the resource</a:t>
+              <a:t>the path is the name of the resource</a:t>
+            </a:r>
+          </a:p>
+          <a:p>
+            <a:pPr lvl="1"/>
+            <a:r>
+              <a:rPr lang="en-US" dirty="0"/>
+              <a:t>there are several ways in which the value of the new resource can be transmitted (more later)</a:t>
+            </a:r>
+          </a:p>
+          <a:p>
+            <a:r>
+              <a:rPr lang="en-US" dirty="0"/>
+              <a:t>PUT: requests the server to change the value of the resource to the given value</a:t>
             </a:r>
           </a:p>
           <a:p>
@@ -5099,7 +5113,7 @@
         </p:nvSpPr>
         <p:spPr>
           <a:xfrm>
-            <a:off x="8824606" y="2050095"/>
+            <a:off x="7239001" y="2465092"/>
             <a:ext cx="2743199" cy="723585"/>
           </a:xfrm>
           <a:prstGeom prst="rect">
@@ -5294,87 +5308,6 @@
       </p:sp>
       <p:sp>
         <p:nvSpPr>
-          <p:cNvPr id="3" name="Content Placeholder 2">
-            <a:extLst>
-              <a:ext uri="{FF2B5EF4-FFF2-40B4-BE49-F238E27FC236}">
-                <a16:creationId xmlns:a16="http://schemas.microsoft.com/office/drawing/2014/main" id="{2952F40B-47FD-4416-BD38-74A867B711A6}"/>
-              </a:ext>
-            </a:extLst>
-          </p:cNvPr>
-          <p:cNvSpPr>
-            <a:spLocks noGrp="1"/>
-          </p:cNvSpPr>
-          <p:nvPr>
-            <p:ph idx="1"/>
-          </p:nvPr>
-        </p:nvSpPr>
-        <p:spPr>
-          <a:xfrm>
-            <a:off x="838200" y="1500160"/>
-            <a:ext cx="8862060" cy="4351338"/>
-          </a:xfrm>
-        </p:spPr>
-        <p:txBody>
-          <a:bodyPr/>
-          <a:lstStyle/>
-          <a:p>
-            <a:r>
-              <a:rPr lang="en-US" dirty="0"/>
-              <a:t>This request probably started out as http://www.nowhere123.com/docs/index.html</a:t>
-            </a:r>
-          </a:p>
-          <a:p>
-            <a:r>
-              <a:rPr lang="en-US" dirty="0">
-                <a:hlinkClick r:id="rId2"/>
-              </a:rPr>
-              <a:t>www.nowhere123.com</a:t>
-            </a:r>
-            <a:r>
-              <a:rPr lang="en-US" dirty="0"/>
-              <a:t> identifies the server</a:t>
-            </a:r>
-          </a:p>
-          <a:p>
-            <a:r>
-              <a:rPr lang="en-US" dirty="0"/>
-              <a:t>the rest of the request is the </a:t>
-            </a:r>
-            <a:r>
-              <a:rPr lang="en-US" dirty="0">
-                <a:solidFill>
-                  <a:srgbClr val="FF0000"/>
-                </a:solidFill>
-              </a:rPr>
-              <a:t>path</a:t>
-            </a:r>
-            <a:r>
-              <a:rPr lang="en-US" dirty="0"/>
-              <a:t>, here /docs/index.html</a:t>
-            </a:r>
-          </a:p>
-          <a:p>
-            <a:r>
-              <a:rPr lang="en-US" dirty="0"/>
-              <a:t>this might be a path in the server's file system,</a:t>
-            </a:r>
-          </a:p>
-          <a:p>
-            <a:r>
-              <a:rPr lang="en-US" dirty="0"/>
-              <a:t>OR it could be anything at all—</a:t>
-            </a:r>
-          </a:p>
-          <a:p>
-            <a:r>
-              <a:rPr lang="en-US" dirty="0"/>
-              <a:t>it's entirely up to the server to interpret the path</a:t>
-            </a:r>
-          </a:p>
-        </p:txBody>
-      </p:sp>
-      <p:sp>
-        <p:nvSpPr>
           <p:cNvPr id="4" name="Slide Number Placeholder 3">
             <a:extLst>
               <a:ext uri="{FF2B5EF4-FFF2-40B4-BE49-F238E27FC236}">
@@ -5416,7 +5349,7 @@
         </p:nvSpPr>
         <p:spPr>
           <a:xfrm>
-            <a:off x="1314773" y="4888530"/>
+            <a:off x="899776" y="1493133"/>
             <a:ext cx="7141699" cy="1815882"/>
           </a:xfrm>
           <a:prstGeom prst="rect">
@@ -5587,7 +5520,7 @@
         </p:nvSpPr>
         <p:spPr>
           <a:xfrm>
-            <a:off x="8824606" y="3675829"/>
+            <a:off x="8719099" y="5392087"/>
             <a:ext cx="2743199" cy="1062170"/>
           </a:xfrm>
           <a:prstGeom prst="rect">
@@ -5633,6 +5566,89 @@
                 <a:latin typeface="Ink Free" panose="03080402000500000000" pitchFamily="66" charset="0"/>
               </a:rPr>
               <a:t>We'll see later how these paths are interpreted in REST protocols.</a:t>
+            </a:r>
+          </a:p>
+        </p:txBody>
+      </p:sp>
+      <p:sp>
+        <p:nvSpPr>
+          <p:cNvPr id="3" name="Content Placeholder 2">
+            <a:extLst>
+              <a:ext uri="{FF2B5EF4-FFF2-40B4-BE49-F238E27FC236}">
+                <a16:creationId xmlns:a16="http://schemas.microsoft.com/office/drawing/2014/main" id="{2952F40B-47FD-4416-BD38-74A867B711A6}"/>
+              </a:ext>
+            </a:extLst>
+          </p:cNvPr>
+          <p:cNvSpPr>
+            <a:spLocks noGrp="1"/>
+          </p:cNvSpPr>
+          <p:nvPr>
+            <p:ph idx="1"/>
+          </p:nvPr>
+        </p:nvSpPr>
+        <p:spPr>
+          <a:xfrm>
+            <a:off x="899775" y="3429000"/>
+            <a:ext cx="9566587" cy="3292475"/>
+          </a:xfrm>
+        </p:spPr>
+        <p:txBody>
+          <a:bodyPr>
+            <a:normAutofit fontScale="92500"/>
+          </a:bodyPr>
+          <a:lstStyle/>
+          <a:p>
+            <a:r>
+              <a:rPr lang="en-US" dirty="0"/>
+              <a:t>This request probably started out as http://www.nowhere123.com/docs/index.html</a:t>
+            </a:r>
+          </a:p>
+          <a:p>
+            <a:r>
+              <a:rPr lang="en-US" dirty="0">
+                <a:hlinkClick r:id="rId2"/>
+              </a:rPr>
+              <a:t>www.nowhere123.com</a:t>
+            </a:r>
+            <a:r>
+              <a:rPr lang="en-US" dirty="0"/>
+              <a:t> identifies the host (the server's location)</a:t>
+            </a:r>
+          </a:p>
+          <a:p>
+            <a:r>
+              <a:rPr lang="en-US" dirty="0"/>
+              <a:t>the rest of the request is the </a:t>
+            </a:r>
+            <a:r>
+              <a:rPr lang="en-US" dirty="0">
+                <a:solidFill>
+                  <a:srgbClr val="FF0000"/>
+                </a:solidFill>
+              </a:rPr>
+              <a:t>path</a:t>
+            </a:r>
+            <a:r>
+              <a:rPr lang="en-US" dirty="0"/>
+              <a:t>, here /docs/index.html</a:t>
+            </a:r>
+          </a:p>
+          <a:p>
+            <a:r>
+              <a:rPr lang="en-US" dirty="0"/>
+              <a:t>this might be a path in the server's file system,</a:t>
+            </a:r>
+          </a:p>
+          <a:p>
+            <a:r>
+              <a:rPr lang="en-US" dirty="0"/>
+              <a:t>OR it could be anything at all—</a:t>
+            </a:r>
+          </a:p>
+          <a:p>
+            <a:r>
+              <a:rPr lang="en-US" dirty="0"/>
+              <a:t>it's entirely up to the server to interpret the path</a:t>
             </a:r>
           </a:p>
         </p:txBody>
@@ -6750,7 +6766,7 @@
             <a:pPr lvl="2"/>
             <a:r>
               <a:rPr lang="en-US" dirty="0"/>
-              <a:t>client, server, user-agent</a:t>
+              <a:t>client, server</a:t>
             </a:r>
           </a:p>
           <a:p>
@@ -7290,7 +7306,7 @@
             <a:pPr lvl="2"/>
             <a:r>
               <a:rPr lang="en-US" dirty="0"/>
-              <a:t>client, server, user-agent</a:t>
+              <a:t>client, server</a:t>
             </a:r>
           </a:p>
           <a:p>
@@ -7479,7 +7495,7 @@
           <a:p>
             <a:r>
               <a:rPr lang="en-US" dirty="0"/>
-              <a:t>Originally developed (1998-1991) by Tim Berners-Lee as a protocol for transmitting web pages.</a:t>
+              <a:t>Originally developed (1989-1991) by Tim Berners-Lee as a protocol for transmitting web pages.</a:t>
             </a:r>
           </a:p>
           <a:p>
@@ -7657,7 +7673,19 @@
             </a:r>
             <a:r>
               <a:rPr lang="en-US" dirty="0"/>
-              <a:t> replies by sending a response.</a:t>
+              <a:t> replies by sending a </a:t>
+            </a:r>
+            <a:r>
+              <a:rPr lang="en-US" dirty="0">
+                <a:solidFill>
+                  <a:srgbClr val="FF0000"/>
+                </a:solidFill>
+              </a:rPr>
+              <a:t>response</a:t>
+            </a:r>
+            <a:r>
+              <a:rPr lang="en-US" dirty="0"/>
+              <a:t>.</a:t>
             </a:r>
           </a:p>
         </p:txBody>
@@ -7874,6 +7902,33 @@
               <a:t>Each request/response pair is independent.</a:t>
             </a:r>
           </a:p>
+          <a:p>
+            <a:r>
+              <a:rPr lang="en-US" dirty="0"/>
+              <a:t>If the client intends the request to be part of a session, then the request must include all of the data needed to allow the server to resume the session at that point.</a:t>
+            </a:r>
+          </a:p>
+          <a:p>
+            <a:pPr lvl="1"/>
+            <a:r>
+              <a:rPr lang="en-US" dirty="0"/>
+              <a:t>we'll see later how this data can be included in the request.</a:t>
+            </a:r>
+          </a:p>
+          <a:p>
+            <a:r>
+              <a:rPr lang="en-US" dirty="0"/>
+              <a:t>We say "Http is stateless but not </a:t>
+            </a:r>
+            <a:r>
+              <a:rPr lang="en-US" dirty="0" err="1"/>
+              <a:t>sessionless</a:t>
+            </a:r>
+            <a:r>
+              <a:rPr lang="en-US" dirty="0"/>
+              <a:t>"</a:t>
+            </a:r>
+          </a:p>
         </p:txBody>
       </p:sp>
       <p:sp>
@@ -8222,13 +8277,7 @@
           <a:p>
             <a:r>
               <a:rPr lang="en-US" dirty="0"/>
-              <a:t>Similarly, the client and server may agree on a protocol defining a sequence of HTTP messages</a:t>
-            </a:r>
-          </a:p>
-          <a:p>
-            <a:r>
-              <a:rPr lang="en-US" dirty="0"/>
-              <a:t>These protocols may be arbitrarily complex, but we'll learn about a useful class of simple protocols, called </a:t>
+              <a:t>The interpretation may be arbitrarily complex, but we'll learn about a useful class of simple protocols, called </a:t>
             </a:r>
             <a:r>
               <a:rPr lang="en-US" dirty="0">
@@ -8514,7 +8563,19 @@
             </a:r>
             <a:r>
               <a:rPr lang="en-US" dirty="0"/>
-              <a:t>, which define the kind of data the server is sending and the kind of data it expects (or is willing to) receive.</a:t>
+              <a:t>, which define the kind of data the </a:t>
+            </a:r>
+            <a:r>
+              <a:rPr lang="en-US" dirty="0">
+                <a:solidFill>
+                  <a:srgbClr val="00B050"/>
+                </a:solidFill>
+              </a:rPr>
+              <a:t>client</a:t>
+            </a:r>
+            <a:r>
+              <a:rPr lang="en-US" dirty="0"/>
+              <a:t> is sending and the kind of data it expects (or is willing to) receive.</a:t>
             </a:r>
           </a:p>
           <a:p>
@@ -8532,7 +8593,15 @@
             </a:r>
             <a:r>
               <a:rPr lang="en-US" dirty="0"/>
-              <a:t>, which indicate whether the request was successful or not, and the format or formats in which the data is transmitted.</a:t>
+              <a:t>, which indicate whether the request was successful or not, and the format or formats in which </a:t>
+            </a:r>
+            <a:r>
+              <a:rPr lang="en-US"/>
+              <a:t>the reply data </a:t>
+            </a:r>
+            <a:r>
+              <a:rPr lang="en-US" dirty="0"/>
+              <a:t>is transmitted.</a:t>
             </a:r>
           </a:p>
           <a:p>
@@ -8575,6 +8644,70 @@
               <a:t>8</a:t>
             </a:fld>
             <a:endParaRPr lang="en-US"/>
+          </a:p>
+        </p:txBody>
+      </p:sp>
+      <p:sp>
+        <p:nvSpPr>
+          <p:cNvPr id="5" name="Rectangle 4">
+            <a:extLst>
+              <a:ext uri="{FF2B5EF4-FFF2-40B4-BE49-F238E27FC236}">
+                <a16:creationId xmlns:a16="http://schemas.microsoft.com/office/drawing/2014/main" id="{95682D32-1747-4CD7-9012-BD584C35B7CE}"/>
+              </a:ext>
+            </a:extLst>
+          </p:cNvPr>
+          <p:cNvSpPr/>
+          <p:nvPr/>
+        </p:nvSpPr>
+        <p:spPr>
+          <a:xfrm>
+            <a:off x="8809952" y="1621242"/>
+            <a:ext cx="2743199" cy="1220431"/>
+          </a:xfrm>
+          <a:prstGeom prst="rect">
+            <a:avLst/>
+          </a:prstGeom>
+          <a:solidFill>
+            <a:schemeClr val="accent2">
+              <a:lumMod val="20000"/>
+              <a:lumOff val="80000"/>
+            </a:schemeClr>
+          </a:solidFill>
+          <a:ln>
+            <a:solidFill>
+              <a:srgbClr val="0070C0"/>
+            </a:solidFill>
+          </a:ln>
+        </p:spPr>
+        <p:style>
+          <a:lnRef idx="2">
+            <a:schemeClr val="accent1">
+              <a:shade val="50000"/>
+            </a:schemeClr>
+          </a:lnRef>
+          <a:fillRef idx="1">
+            <a:schemeClr val="accent1"/>
+          </a:fillRef>
+          <a:effectRef idx="0">
+            <a:schemeClr val="accent1"/>
+          </a:effectRef>
+          <a:fontRef idx="minor">
+            <a:schemeClr val="lt1"/>
+          </a:fontRef>
+        </p:style>
+        <p:txBody>
+          <a:bodyPr rtlCol="0" anchor="t"/>
+          <a:lstStyle/>
+          <a:p>
+            <a:r>
+              <a:rPr lang="en-US" b="1" dirty="0">
+                <a:solidFill>
+                  <a:schemeClr val="tx1"/>
+                </a:solidFill>
+                <a:latin typeface="Ink Free" panose="03080402000500000000" pitchFamily="66" charset="0"/>
+              </a:rPr>
+              <a:t>Oops!  The version in the video says "server".  It's the client who sends the request, of course.</a:t>
+            </a:r>
           </a:p>
         </p:txBody>
       </p:sp>
@@ -8588,6 +8721,84 @@
   <p:clrMapOvr>
     <a:masterClrMapping/>
   </p:clrMapOvr>
+  <p:timing>
+    <p:tnLst>
+      <p:par>
+        <p:cTn id="1" dur="indefinite" restart="never" nodeType="tmRoot">
+          <p:childTnLst>
+            <p:seq concurrent="1" nextAc="seek">
+              <p:cTn id="2" dur="indefinite" nodeType="mainSeq">
+                <p:childTnLst>
+                  <p:par>
+                    <p:cTn id="3" fill="hold">
+                      <p:stCondLst>
+                        <p:cond delay="indefinite"/>
+                      </p:stCondLst>
+                      <p:childTnLst>
+                        <p:par>
+                          <p:cTn id="4" fill="hold">
+                            <p:stCondLst>
+                              <p:cond delay="0"/>
+                            </p:stCondLst>
+                            <p:childTnLst>
+                              <p:par>
+                                <p:cTn id="5" presetID="1" presetClass="entr" presetSubtype="0" fill="hold" grpId="0" nodeType="clickEffect">
+                                  <p:stCondLst>
+                                    <p:cond delay="0"/>
+                                  </p:stCondLst>
+                                  <p:childTnLst>
+                                    <p:set>
+                                      <p:cBhvr>
+                                        <p:cTn id="6" dur="1" fill="hold">
+                                          <p:stCondLst>
+                                            <p:cond delay="9"/>
+                                          </p:stCondLst>
+                                        </p:cTn>
+                                        <p:tgtEl>
+                                          <p:spTgt spid="5"/>
+                                        </p:tgtEl>
+                                        <p:attrNameLst>
+                                          <p:attrName>style.visibility</p:attrName>
+                                        </p:attrNameLst>
+                                      </p:cBhvr>
+                                      <p:to>
+                                        <p:strVal val="visible"/>
+                                      </p:to>
+                                    </p:set>
+                                  </p:childTnLst>
+                                </p:cTn>
+                              </p:par>
+                            </p:childTnLst>
+                          </p:cTn>
+                        </p:par>
+                      </p:childTnLst>
+                    </p:cTn>
+                  </p:par>
+                </p:childTnLst>
+              </p:cTn>
+              <p:prevCondLst>
+                <p:cond evt="onPrev" delay="0">
+                  <p:tgtEl>
+                    <p:sldTgt/>
+                  </p:tgtEl>
+                </p:cond>
+              </p:prevCondLst>
+              <p:nextCondLst>
+                <p:cond evt="onNext" delay="0">
+                  <p:tgtEl>
+                    <p:sldTgt/>
+                  </p:tgtEl>
+                </p:cond>
+              </p:nextCondLst>
+            </p:seq>
+          </p:childTnLst>
+        </p:cTn>
+      </p:par>
+    </p:tnLst>
+    <p:bldLst>
+      <p:bldP spid="5" grpId="0" animBg="1"/>
+    </p:bldLst>
+  </p:timing>
 </p:sld>
 </file>
 

</xml_diff>